<commit_message>
Updated README.md and PowerPoint
</commit_message>
<xml_diff>
--- a/PDN May 2023.pptx
+++ b/PDN May 2023.pptx
@@ -154,6 +154,139 @@
 
 <file path=ppt/changesInfos/changesInfo1.xml><?xml version="1.0" encoding="utf-8"?>
 <pc:chgInfo xmlns:a="http://schemas.openxmlformats.org/drawingml/2006/main" xmlns:r="http://schemas.openxmlformats.org/officeDocument/2006/relationships" xmlns:ac="http://schemas.microsoft.com/office/drawing/2013/main/command" xmlns:pc="http://schemas.microsoft.com/office/powerpoint/2013/main/command">
+  <pc:docChgLst>
+    <pc:chgData name="Louis Berman" userId="a562264b7ba45ef8" providerId="LiveId" clId="{27659EDE-4319-42B0-BDB8-1574B1601A57}"/>
+    <pc:docChg chg="undo custSel modSld modMainMaster">
+      <pc:chgData name="Louis Berman" userId="a562264b7ba45ef8" providerId="LiveId" clId="{27659EDE-4319-42B0-BDB8-1574B1601A57}" dt="2023-05-13T12:08:57.537" v="191" actId="20577"/>
+      <pc:docMkLst>
+        <pc:docMk/>
+      </pc:docMkLst>
+      <pc:sldChg chg="modSp mod">
+        <pc:chgData name="Louis Berman" userId="a562264b7ba45ef8" providerId="LiveId" clId="{27659EDE-4319-42B0-BDB8-1574B1601A57}" dt="2023-05-13T12:05:27.940" v="143" actId="20577"/>
+        <pc:sldMkLst>
+          <pc:docMk/>
+          <pc:sldMk cId="1859527893" sldId="296"/>
+        </pc:sldMkLst>
+        <pc:spChg chg="mod">
+          <ac:chgData name="Louis Berman" userId="a562264b7ba45ef8" providerId="LiveId" clId="{27659EDE-4319-42B0-BDB8-1574B1601A57}" dt="2023-05-13T12:05:27.940" v="143" actId="20577"/>
+          <ac:spMkLst>
+            <pc:docMk/>
+            <pc:sldMk cId="1859527893" sldId="296"/>
+            <ac:spMk id="3" creationId="{22788C46-D0BC-4307-AE55-7601A139E7CB}"/>
+          </ac:spMkLst>
+        </pc:spChg>
+      </pc:sldChg>
+      <pc:sldChg chg="modSp mod">
+        <pc:chgData name="Louis Berman" userId="a562264b7ba45ef8" providerId="LiveId" clId="{27659EDE-4319-42B0-BDB8-1574B1601A57}" dt="2023-05-13T11:58:15.954" v="28" actId="20577"/>
+        <pc:sldMkLst>
+          <pc:docMk/>
+          <pc:sldMk cId="317718070" sldId="305"/>
+        </pc:sldMkLst>
+        <pc:spChg chg="mod">
+          <ac:chgData name="Louis Berman" userId="a562264b7ba45ef8" providerId="LiveId" clId="{27659EDE-4319-42B0-BDB8-1574B1601A57}" dt="2023-05-13T11:58:15.954" v="28" actId="20577"/>
+          <ac:spMkLst>
+            <pc:docMk/>
+            <pc:sldMk cId="317718070" sldId="305"/>
+            <ac:spMk id="2" creationId="{DD24180B-35BA-C28E-820F-59C84FBDD99A}"/>
+          </ac:spMkLst>
+        </pc:spChg>
+        <pc:spChg chg="mod">
+          <ac:chgData name="Louis Berman" userId="a562264b7ba45ef8" providerId="LiveId" clId="{27659EDE-4319-42B0-BDB8-1574B1601A57}" dt="2023-05-13T11:58:07.354" v="11" actId="20577"/>
+          <ac:spMkLst>
+            <pc:docMk/>
+            <pc:sldMk cId="317718070" sldId="305"/>
+            <ac:spMk id="3" creationId="{626260E8-21BF-1371-4767-5E86248A7A7B}"/>
+          </ac:spMkLst>
+        </pc:spChg>
+      </pc:sldChg>
+      <pc:sldChg chg="modSp mod">
+        <pc:chgData name="Louis Berman" userId="a562264b7ba45ef8" providerId="LiveId" clId="{27659EDE-4319-42B0-BDB8-1574B1601A57}" dt="2023-05-13T12:01:16.120" v="48" actId="404"/>
+        <pc:sldMkLst>
+          <pc:docMk/>
+          <pc:sldMk cId="1732999477" sldId="306"/>
+        </pc:sldMkLst>
+        <pc:spChg chg="mod">
+          <ac:chgData name="Louis Berman" userId="a562264b7ba45ef8" providerId="LiveId" clId="{27659EDE-4319-42B0-BDB8-1574B1601A57}" dt="2023-05-13T12:01:16.120" v="48" actId="404"/>
+          <ac:spMkLst>
+            <pc:docMk/>
+            <pc:sldMk cId="1732999477" sldId="306"/>
+            <ac:spMk id="3" creationId="{1A585715-2793-160B-269E-D9516C84D73A}"/>
+          </ac:spMkLst>
+        </pc:spChg>
+      </pc:sldChg>
+      <pc:sldChg chg="modSp mod">
+        <pc:chgData name="Louis Berman" userId="a562264b7ba45ef8" providerId="LiveId" clId="{27659EDE-4319-42B0-BDB8-1574B1601A57}" dt="2023-05-13T12:06:22.083" v="174" actId="20577"/>
+        <pc:sldMkLst>
+          <pc:docMk/>
+          <pc:sldMk cId="2790251853" sldId="316"/>
+        </pc:sldMkLst>
+        <pc:spChg chg="mod">
+          <ac:chgData name="Louis Berman" userId="a562264b7ba45ef8" providerId="LiveId" clId="{27659EDE-4319-42B0-BDB8-1574B1601A57}" dt="2023-05-13T12:06:22.083" v="174" actId="20577"/>
+          <ac:spMkLst>
+            <pc:docMk/>
+            <pc:sldMk cId="2790251853" sldId="316"/>
+            <ac:spMk id="5" creationId="{AAF5CF3F-E5EF-5769-3F83-24ADB4412BBF}"/>
+          </ac:spMkLst>
+        </pc:spChg>
+      </pc:sldChg>
+      <pc:sldMasterChg chg="modSldLayout">
+        <pc:chgData name="Louis Berman" userId="a562264b7ba45ef8" providerId="LiveId" clId="{27659EDE-4319-42B0-BDB8-1574B1601A57}" dt="2023-05-13T12:08:57.537" v="191" actId="20577"/>
+        <pc:sldMasterMkLst>
+          <pc:docMk/>
+          <pc:sldMasterMk cId="1788353970" sldId="2147483648"/>
+        </pc:sldMasterMkLst>
+        <pc:sldLayoutChg chg="modSp mod">
+          <pc:chgData name="Louis Berman" userId="a562264b7ba45ef8" providerId="LiveId" clId="{27659EDE-4319-42B0-BDB8-1574B1601A57}" dt="2023-05-13T12:08:57.537" v="191" actId="20577"/>
+          <pc:sldLayoutMkLst>
+            <pc:docMk/>
+            <pc:sldMasterMk cId="1788353970" sldId="2147483648"/>
+            <pc:sldLayoutMk cId="953980513" sldId="2147483668"/>
+          </pc:sldLayoutMkLst>
+          <pc:spChg chg="mod">
+            <ac:chgData name="Louis Berman" userId="a562264b7ba45ef8" providerId="LiveId" clId="{27659EDE-4319-42B0-BDB8-1574B1601A57}" dt="2023-05-13T12:08:57.537" v="191" actId="20577"/>
+            <ac:spMkLst>
+              <pc:docMk/>
+              <pc:sldMasterMk cId="1788353970" sldId="2147483648"/>
+              <pc:sldLayoutMk cId="953980513" sldId="2147483668"/>
+              <ac:spMk id="8" creationId="{3A51CCCC-1589-401D-AE98-FC28716301EF}"/>
+            </ac:spMkLst>
+          </pc:spChg>
+        </pc:sldLayoutChg>
+      </pc:sldMasterChg>
+    </pc:docChg>
+  </pc:docChgLst>
+  <pc:docChgLst>
+    <pc:chgData name="Louis Berman" userId="a562264b7ba45ef8" providerId="LiveId" clId="{54B41100-9A88-4D19-86C2-D393F773221B}"/>
+    <pc:docChg chg="modSld">
+      <pc:chgData name="Louis Berman" userId="a562264b7ba45ef8" providerId="LiveId" clId="{54B41100-9A88-4D19-86C2-D393F773221B}" dt="2023-03-08T01:56:05.574" v="27" actId="20577"/>
+      <pc:docMkLst>
+        <pc:docMk/>
+      </pc:docMkLst>
+      <pc:sldChg chg="modSp mod">
+        <pc:chgData name="Louis Berman" userId="a562264b7ba45ef8" providerId="LiveId" clId="{54B41100-9A88-4D19-86C2-D393F773221B}" dt="2023-03-08T01:56:05.574" v="27" actId="20577"/>
+        <pc:sldMkLst>
+          <pc:docMk/>
+          <pc:sldMk cId="317718070" sldId="305"/>
+        </pc:sldMkLst>
+        <pc:spChg chg="mod">
+          <ac:chgData name="Louis Berman" userId="a562264b7ba45ef8" providerId="LiveId" clId="{54B41100-9A88-4D19-86C2-D393F773221B}" dt="2023-03-08T01:55:58.175" v="13" actId="20577"/>
+          <ac:spMkLst>
+            <pc:docMk/>
+            <pc:sldMk cId="317718070" sldId="305"/>
+            <ac:spMk id="2" creationId="{DD24180B-35BA-C28E-820F-59C84FBDD99A}"/>
+          </ac:spMkLst>
+        </pc:spChg>
+        <pc:spChg chg="mod">
+          <ac:chgData name="Louis Berman" userId="a562264b7ba45ef8" providerId="LiveId" clId="{54B41100-9A88-4D19-86C2-D393F773221B}" dt="2023-03-08T01:56:05.574" v="27" actId="20577"/>
+          <ac:spMkLst>
+            <pc:docMk/>
+            <pc:sldMk cId="317718070" sldId="305"/>
+            <ac:spMk id="3" creationId="{626260E8-21BF-1371-4767-5E86248A7A7B}"/>
+          </ac:spMkLst>
+        </pc:spChg>
+      </pc:sldChg>
+    </pc:docChg>
+  </pc:docChgLst>
   <pc:docChgLst>
     <pc:chgData name="Louis Berman" userId="a562264b7ba45ef8" providerId="LiveId" clId="{47BA5D07-0137-4DBD-BF27-8F56D5CE6DBB}"/>
     <pc:docChg chg="undo redo custSel addSld delSld modSld sldOrd modMainMaster">
@@ -1124,133 +1257,39 @@
     </pc:docChg>
   </pc:docChgLst>
   <pc:docChgLst>
-    <pc:chgData name="Louis Berman" userId="a562264b7ba45ef8" providerId="LiveId" clId="{27659EDE-4319-42B0-BDB8-1574B1601A57}"/>
-    <pc:docChg chg="undo custSel modSld modMainMaster">
-      <pc:chgData name="Louis Berman" userId="a562264b7ba45ef8" providerId="LiveId" clId="{27659EDE-4319-42B0-BDB8-1574B1601A57}" dt="2023-05-13T12:08:57.537" v="191" actId="20577"/>
+    <pc:chgData name="Louis Berman" userId="a562264b7ba45ef8" providerId="LiveId" clId="{0CF82FBB-0B98-461C-B08C-2EA6430C3712}"/>
+    <pc:docChg chg="undo custSel modSld">
+      <pc:chgData name="Louis Berman" userId="a562264b7ba45ef8" providerId="LiveId" clId="{0CF82FBB-0B98-461C-B08C-2EA6430C3712}" dt="2023-05-17T14:26:18.754" v="19" actId="27636"/>
       <pc:docMkLst>
         <pc:docMk/>
       </pc:docMkLst>
       <pc:sldChg chg="modSp mod">
-        <pc:chgData name="Louis Berman" userId="a562264b7ba45ef8" providerId="LiveId" clId="{27659EDE-4319-42B0-BDB8-1574B1601A57}" dt="2023-05-13T12:05:27.940" v="143" actId="20577"/>
+        <pc:chgData name="Louis Berman" userId="a562264b7ba45ef8" providerId="LiveId" clId="{0CF82FBB-0B98-461C-B08C-2EA6430C3712}" dt="2023-05-17T14:26:18.754" v="19" actId="27636"/>
         <pc:sldMkLst>
           <pc:docMk/>
-          <pc:sldMk cId="1859527893" sldId="296"/>
+          <pc:sldMk cId="1974146263" sldId="322"/>
         </pc:sldMkLst>
         <pc:spChg chg="mod">
-          <ac:chgData name="Louis Berman" userId="a562264b7ba45ef8" providerId="LiveId" clId="{27659EDE-4319-42B0-BDB8-1574B1601A57}" dt="2023-05-13T12:05:27.940" v="143" actId="20577"/>
+          <ac:chgData name="Louis Berman" userId="a562264b7ba45ef8" providerId="LiveId" clId="{0CF82FBB-0B98-461C-B08C-2EA6430C3712}" dt="2023-05-17T14:26:18.754" v="19" actId="27636"/>
           <ac:spMkLst>
             <pc:docMk/>
-            <pc:sldMk cId="1859527893" sldId="296"/>
-            <ac:spMk id="3" creationId="{22788C46-D0BC-4307-AE55-7601A139E7CB}"/>
+            <pc:sldMk cId="1974146263" sldId="322"/>
+            <ac:spMk id="5" creationId="{BA70B379-EEEC-50B3-65A0-D46B2928E93B}"/>
           </ac:spMkLst>
         </pc:spChg>
       </pc:sldChg>
       <pc:sldChg chg="modSp mod">
-        <pc:chgData name="Louis Berman" userId="a562264b7ba45ef8" providerId="LiveId" clId="{27659EDE-4319-42B0-BDB8-1574B1601A57}" dt="2023-05-13T11:58:15.954" v="28" actId="20577"/>
+        <pc:chgData name="Louis Berman" userId="a562264b7ba45ef8" providerId="LiveId" clId="{0CF82FBB-0B98-461C-B08C-2EA6430C3712}" dt="2023-05-17T14:24:58.916" v="0" actId="113"/>
         <pc:sldMkLst>
           <pc:docMk/>
-          <pc:sldMk cId="317718070" sldId="305"/>
+          <pc:sldMk cId="242256332" sldId="323"/>
         </pc:sldMkLst>
         <pc:spChg chg="mod">
-          <ac:chgData name="Louis Berman" userId="a562264b7ba45ef8" providerId="LiveId" clId="{27659EDE-4319-42B0-BDB8-1574B1601A57}" dt="2023-05-13T11:58:15.954" v="28" actId="20577"/>
+          <ac:chgData name="Louis Berman" userId="a562264b7ba45ef8" providerId="LiveId" clId="{0CF82FBB-0B98-461C-B08C-2EA6430C3712}" dt="2023-05-17T14:24:58.916" v="0" actId="113"/>
           <ac:spMkLst>
             <pc:docMk/>
-            <pc:sldMk cId="317718070" sldId="305"/>
-            <ac:spMk id="2" creationId="{DD24180B-35BA-C28E-820F-59C84FBDD99A}"/>
-          </ac:spMkLst>
-        </pc:spChg>
-        <pc:spChg chg="mod">
-          <ac:chgData name="Louis Berman" userId="a562264b7ba45ef8" providerId="LiveId" clId="{27659EDE-4319-42B0-BDB8-1574B1601A57}" dt="2023-05-13T11:58:07.354" v="11" actId="20577"/>
-          <ac:spMkLst>
-            <pc:docMk/>
-            <pc:sldMk cId="317718070" sldId="305"/>
-            <ac:spMk id="3" creationId="{626260E8-21BF-1371-4767-5E86248A7A7B}"/>
-          </ac:spMkLst>
-        </pc:spChg>
-      </pc:sldChg>
-      <pc:sldChg chg="modSp mod">
-        <pc:chgData name="Louis Berman" userId="a562264b7ba45ef8" providerId="LiveId" clId="{27659EDE-4319-42B0-BDB8-1574B1601A57}" dt="2023-05-13T12:01:16.120" v="48" actId="404"/>
-        <pc:sldMkLst>
-          <pc:docMk/>
-          <pc:sldMk cId="1732999477" sldId="306"/>
-        </pc:sldMkLst>
-        <pc:spChg chg="mod">
-          <ac:chgData name="Louis Berman" userId="a562264b7ba45ef8" providerId="LiveId" clId="{27659EDE-4319-42B0-BDB8-1574B1601A57}" dt="2023-05-13T12:01:16.120" v="48" actId="404"/>
-          <ac:spMkLst>
-            <pc:docMk/>
-            <pc:sldMk cId="1732999477" sldId="306"/>
-            <ac:spMk id="3" creationId="{1A585715-2793-160B-269E-D9516C84D73A}"/>
-          </ac:spMkLst>
-        </pc:spChg>
-      </pc:sldChg>
-      <pc:sldChg chg="modSp mod">
-        <pc:chgData name="Louis Berman" userId="a562264b7ba45ef8" providerId="LiveId" clId="{27659EDE-4319-42B0-BDB8-1574B1601A57}" dt="2023-05-13T12:06:22.083" v="174" actId="20577"/>
-        <pc:sldMkLst>
-          <pc:docMk/>
-          <pc:sldMk cId="2790251853" sldId="316"/>
-        </pc:sldMkLst>
-        <pc:spChg chg="mod">
-          <ac:chgData name="Louis Berman" userId="a562264b7ba45ef8" providerId="LiveId" clId="{27659EDE-4319-42B0-BDB8-1574B1601A57}" dt="2023-05-13T12:06:22.083" v="174" actId="20577"/>
-          <ac:spMkLst>
-            <pc:docMk/>
-            <pc:sldMk cId="2790251853" sldId="316"/>
-            <ac:spMk id="5" creationId="{AAF5CF3F-E5EF-5769-3F83-24ADB4412BBF}"/>
-          </ac:spMkLst>
-        </pc:spChg>
-      </pc:sldChg>
-      <pc:sldMasterChg chg="modSldLayout">
-        <pc:chgData name="Louis Berman" userId="a562264b7ba45ef8" providerId="LiveId" clId="{27659EDE-4319-42B0-BDB8-1574B1601A57}" dt="2023-05-13T12:08:57.537" v="191" actId="20577"/>
-        <pc:sldMasterMkLst>
-          <pc:docMk/>
-          <pc:sldMasterMk cId="1788353970" sldId="2147483648"/>
-        </pc:sldMasterMkLst>
-        <pc:sldLayoutChg chg="modSp mod">
-          <pc:chgData name="Louis Berman" userId="a562264b7ba45ef8" providerId="LiveId" clId="{27659EDE-4319-42B0-BDB8-1574B1601A57}" dt="2023-05-13T12:08:57.537" v="191" actId="20577"/>
-          <pc:sldLayoutMkLst>
-            <pc:docMk/>
-            <pc:sldMasterMk cId="1788353970" sldId="2147483648"/>
-            <pc:sldLayoutMk cId="953980513" sldId="2147483668"/>
-          </pc:sldLayoutMkLst>
-          <pc:spChg chg="mod">
-            <ac:chgData name="Louis Berman" userId="a562264b7ba45ef8" providerId="LiveId" clId="{27659EDE-4319-42B0-BDB8-1574B1601A57}" dt="2023-05-13T12:08:57.537" v="191" actId="20577"/>
-            <ac:spMkLst>
-              <pc:docMk/>
-              <pc:sldMasterMk cId="1788353970" sldId="2147483648"/>
-              <pc:sldLayoutMk cId="953980513" sldId="2147483668"/>
-              <ac:spMk id="8" creationId="{3A51CCCC-1589-401D-AE98-FC28716301EF}"/>
-            </ac:spMkLst>
-          </pc:spChg>
-        </pc:sldLayoutChg>
-      </pc:sldMasterChg>
-    </pc:docChg>
-  </pc:docChgLst>
-  <pc:docChgLst>
-    <pc:chgData name="Louis Berman" userId="a562264b7ba45ef8" providerId="LiveId" clId="{54B41100-9A88-4D19-86C2-D393F773221B}"/>
-    <pc:docChg chg="modSld">
-      <pc:chgData name="Louis Berman" userId="a562264b7ba45ef8" providerId="LiveId" clId="{54B41100-9A88-4D19-86C2-D393F773221B}" dt="2023-03-08T01:56:05.574" v="27" actId="20577"/>
-      <pc:docMkLst>
-        <pc:docMk/>
-      </pc:docMkLst>
-      <pc:sldChg chg="modSp mod">
-        <pc:chgData name="Louis Berman" userId="a562264b7ba45ef8" providerId="LiveId" clId="{54B41100-9A88-4D19-86C2-D393F773221B}" dt="2023-03-08T01:56:05.574" v="27" actId="20577"/>
-        <pc:sldMkLst>
-          <pc:docMk/>
-          <pc:sldMk cId="317718070" sldId="305"/>
-        </pc:sldMkLst>
-        <pc:spChg chg="mod">
-          <ac:chgData name="Louis Berman" userId="a562264b7ba45ef8" providerId="LiveId" clId="{54B41100-9A88-4D19-86C2-D393F773221B}" dt="2023-03-08T01:55:58.175" v="13" actId="20577"/>
-          <ac:spMkLst>
-            <pc:docMk/>
-            <pc:sldMk cId="317718070" sldId="305"/>
-            <ac:spMk id="2" creationId="{DD24180B-35BA-C28E-820F-59C84FBDD99A}"/>
-          </ac:spMkLst>
-        </pc:spChg>
-        <pc:spChg chg="mod">
-          <ac:chgData name="Louis Berman" userId="a562264b7ba45ef8" providerId="LiveId" clId="{54B41100-9A88-4D19-86C2-D393F773221B}" dt="2023-03-08T01:56:05.574" v="27" actId="20577"/>
-          <ac:spMkLst>
-            <pc:docMk/>
-            <pc:sldMk cId="317718070" sldId="305"/>
-            <ac:spMk id="3" creationId="{626260E8-21BF-1371-4767-5E86248A7A7B}"/>
+            <pc:sldMk cId="242256332" sldId="323"/>
+            <ac:spMk id="13" creationId="{62D4AFD4-BEE8-4121-EB83-EE6C61E67FA9}"/>
           </ac:spMkLst>
         </pc:spChg>
       </pc:sldChg>
@@ -1353,7 +1392,7 @@
           <a:p>
             <a:fld id="{62A5AE42-7DC1-8140-9B13-146984FDEF22}" type="datetimeFigureOut">
               <a:rPr lang="en-US" smtClean="0"/>
-              <a:t>5/16/2023</a:t>
+              <a:t>5/17/2023</a:t>
             </a:fld>
             <a:endParaRPr lang="en-US" dirty="0"/>
           </a:p>
@@ -1530,7 +1569,7 @@
           <a:p>
             <a:fld id="{E8F75F72-8950-AF4F-9381-1D26FB547EA1}" type="datetimeFigureOut">
               <a:rPr lang="en-US" smtClean="0"/>
-              <a:t>5/16/2023</a:t>
+              <a:t>5/17/2023</a:t>
             </a:fld>
             <a:endParaRPr lang="en-US" dirty="0"/>
           </a:p>
@@ -12466,12 +12505,12 @@
           <a:lstStyle/>
           <a:p>
             <a:r>
-              <a:rPr lang="en-US" dirty="0">
+              <a:rPr lang="en-US" b="1" dirty="0">
                 <a:hlinkClick r:id="rId3"/>
               </a:rPr>
               <a:t>https://github.com/squideyes/PdnErrorHandling</a:t>
             </a:r>
-            <a:endParaRPr lang="en-US" dirty="0"/>
+            <a:endParaRPr lang="en-US" b="1" dirty="0"/>
           </a:p>
         </p:txBody>
       </p:sp>
@@ -13631,10 +13670,38 @@
         <p:spPr/>
         <p:txBody>
           <a:bodyPr>
-            <a:normAutofit lnSpcReduction="10000"/>
+            <a:normAutofit fontScale="85000" lnSpcReduction="20000"/>
           </a:bodyPr>
           <a:lstStyle/>
           <a:p>
+            <a:r>
+              <a:rPr lang="en-US" dirty="0"/>
+              <a:t>docker run -d --name seq-dev --restart unless-stopped -p 5341:80 -v "$(</a:t>
+            </a:r>
+            <a:r>
+              <a:rPr lang="en-US" dirty="0" err="1"/>
+              <a:t>pwd</a:t>
+            </a:r>
+            <a:r>
+              <a:rPr lang="en-US" dirty="0"/>
+              <a:t>)/seq-dev:/data" -e ACCEPT_EULA=y </a:t>
+            </a:r>
+            <a:r>
+              <a:rPr lang="en-US" dirty="0" err="1"/>
+              <a:t>datalust</a:t>
+            </a:r>
+            <a:r>
+              <a:rPr lang="en-US" dirty="0"/>
+              <a:t>/</a:t>
+            </a:r>
+            <a:r>
+              <a:rPr lang="en-US" dirty="0" err="1"/>
+              <a:t>seq:latest</a:t>
+            </a:r>
+            <a:endParaRPr lang="en-US" dirty="0"/>
+          </a:p>
+          <a:p>
+            <a:pPr lvl="1"/>
             <a:r>
               <a:rPr lang="en-US" dirty="0"/>
               <a:t>Setup: </a:t>
@@ -13652,12 +13719,28 @@
                   </a:extLst>
                 </a:hlinkClick>
               </a:rPr>
-              <a:t>https://docs.datalust.co/docs/getting-started-with-docker</a:t>
-            </a:r>
-            <a:r>
-              <a:rPr lang="en-US" dirty="0"/>
+              <a:t>https://docs.datalust.co/docs/</a:t>
+            </a:r>
+            <a:r>
+              <a:rPr lang="en-US" b="1">
+                <a:solidFill>
+                  <a:srgbClr val="FF0000"/>
+                </a:solidFill>
+                <a:hlinkClick r:id="rId2">
+                  <a:extLst>
+                    <a:ext uri="{A12FA001-AC4F-418D-AE19-62706E023703}">
+                      <ahyp:hlinkClr xmlns:ahyp="http://schemas.microsoft.com/office/drawing/2018/hyperlinkcolor" val="tx"/>
+                    </a:ext>
+                  </a:extLst>
+                </a:hlinkClick>
+              </a:rPr>
+              <a:t>getting-started-with-docker</a:t>
+            </a:r>
+            <a:r>
+              <a:rPr lang="en-US"/>
               <a:t> </a:t>
             </a:r>
+            <a:endParaRPr lang="en-US" dirty="0"/>
           </a:p>
           <a:p>
             <a:r>
@@ -14736,15 +14819,6 @@
 </file>
 
 <file path=customXml/item1.xml><?xml version="1.0" encoding="utf-8"?>
-<?mso-contentType ?>
-<FormTemplates xmlns="http://schemas.microsoft.com/sharepoint/v3/contenttype/forms">
-  <Display>DocumentLibraryForm</Display>
-  <Edit>DocumentLibraryForm</Edit>
-  <New>DocumentLibraryForm</New>
-</FormTemplates>
-</file>
-
-<file path=customXml/item2.xml><?xml version="1.0" encoding="utf-8"?>
 <p:properties xmlns:p="http://schemas.microsoft.com/office/2006/metadata/properties" xmlns:xsi="http://www.w3.org/2001/XMLSchema-instance" xmlns:pc="http://schemas.microsoft.com/office/infopath/2007/PartnerControls">
   <documentManagement>
     <_ip_UnifiedCompliancePolicyUIAction xmlns="http://schemas.microsoft.com/sharepoint/v3" xsi:nil="true"/>
@@ -14762,6 +14836,15 @@
     <MediaServiceKeyPoints xmlns="71af3243-3dd4-4a8d-8c0d-dd76da1f02a5" xsi:nil="true"/>
   </documentManagement>
 </p:properties>
+</file>
+
+<file path=customXml/item2.xml><?xml version="1.0" encoding="utf-8"?>
+<?mso-contentType ?>
+<FormTemplates xmlns="http://schemas.microsoft.com/sharepoint/v3/contenttype/forms">
+  <Display>DocumentLibraryForm</Display>
+  <Edit>DocumentLibraryForm</Edit>
+  <New>DocumentLibraryForm</New>
+</FormTemplates>
 </file>
 
 <file path=customXml/item3.xml><?xml version="1.0" encoding="utf-8"?>
@@ -15053,14 +15136,6 @@
 </file>
 
 <file path=customXml/itemProps1.xml><?xml version="1.0" encoding="utf-8"?>
-<ds:datastoreItem xmlns:ds="http://schemas.openxmlformats.org/officeDocument/2006/customXml" ds:itemID="{9ACE2AAA-C718-435C-B4E6-95A08ACAC441}">
-  <ds:schemaRefs>
-    <ds:schemaRef ds:uri="http://schemas.microsoft.com/sharepoint/v3/contenttype/forms"/>
-  </ds:schemaRefs>
-</ds:datastoreItem>
-</file>
-
-<file path=customXml/itemProps2.xml><?xml version="1.0" encoding="utf-8"?>
 <ds:datastoreItem xmlns:ds="http://schemas.openxmlformats.org/officeDocument/2006/customXml" ds:itemID="{8FBB2F3B-6257-41BB-8B64-5AC7494F274B}">
   <ds:schemaRefs>
     <ds:schemaRef ds:uri="http://schemas.microsoft.com/office/2006/metadata/properties"/>
@@ -15068,6 +15143,14 @@
     <ds:schemaRef ds:uri="http://schemas.microsoft.com/sharepoint/v3"/>
     <ds:schemaRef ds:uri="71af3243-3dd4-4a8d-8c0d-dd76da1f02a5"/>
     <ds:schemaRef ds:uri="230e9df3-be65-4c73-a93b-d1236ebd677e"/>
+  </ds:schemaRefs>
+</ds:datastoreItem>
+</file>
+
+<file path=customXml/itemProps2.xml><?xml version="1.0" encoding="utf-8"?>
+<ds:datastoreItem xmlns:ds="http://schemas.openxmlformats.org/officeDocument/2006/customXml" ds:itemID="{9ACE2AAA-C718-435C-B4E6-95A08ACAC441}">
+  <ds:schemaRefs>
+    <ds:schemaRef ds:uri="http://schemas.microsoft.com/sharepoint/v3/contenttype/forms"/>
   </ds:schemaRefs>
 </ds:datastoreItem>
 </file>

</xml_diff>